<commit_message>
Cleaning up the repository
</commit_message>
<xml_diff>
--- a/Project_1 Slidedeck.pptx
+++ b/Project_1 Slidedeck.pptx
@@ -7,15 +7,18 @@
   <p:sldIdLst>
     <p:sldId id="256" r:id="rId2"/>
     <p:sldId id="258" r:id="rId3"/>
-    <p:sldId id="260" r:id="rId4"/>
-    <p:sldId id="264" r:id="rId5"/>
-    <p:sldId id="259" r:id="rId6"/>
-    <p:sldId id="265" r:id="rId7"/>
-    <p:sldId id="262" r:id="rId8"/>
-    <p:sldId id="266" r:id="rId9"/>
-    <p:sldId id="263" r:id="rId10"/>
-    <p:sldId id="267" r:id="rId11"/>
-    <p:sldId id="268" r:id="rId12"/>
+    <p:sldId id="257" r:id="rId4"/>
+    <p:sldId id="272" r:id="rId5"/>
+    <p:sldId id="264" r:id="rId6"/>
+    <p:sldId id="259" r:id="rId7"/>
+    <p:sldId id="265" r:id="rId8"/>
+    <p:sldId id="270" r:id="rId9"/>
+    <p:sldId id="262" r:id="rId10"/>
+    <p:sldId id="266" r:id="rId11"/>
+    <p:sldId id="271" r:id="rId12"/>
+    <p:sldId id="263" r:id="rId13"/>
+    <p:sldId id="269" r:id="rId14"/>
+    <p:sldId id="268" r:id="rId15"/>
   </p:sldIdLst>
   <p:sldSz cx="12192000" cy="6858000"/>
   <p:notesSz cx="6858000" cy="9144000"/>
@@ -114,6 +117,11 @@
       </a:defRPr>
     </a:lvl9pPr>
   </p:defaultTextStyle>
+  <p:extLst>
+    <p:ext uri="{EFAFB233-063F-42B5-8137-9DF3F51BA10A}">
+      <p15:sldGuideLst xmlns:p15="http://schemas.microsoft.com/office/powerpoint/2012/main"/>
+    </p:ext>
+  </p:extLst>
 </p:presentation>
 </file>
 
@@ -302,7 +310,7 @@
           <a:p>
             <a:fld id="{CA5B5D55-48F2-4437-8BA1-DE24B21E324B}" type="datetimeFigureOut">
               <a:rPr lang="en-US" smtClean="0"/>
-              <a:t>7/15/2024</a:t>
+              <a:t>7/16/2024</a:t>
             </a:fld>
             <a:endParaRPr lang="en-US"/>
           </a:p>
@@ -600,7 +608,7 @@
           <a:p>
             <a:fld id="{CA5B5D55-48F2-4437-8BA1-DE24B21E324B}" type="datetimeFigureOut">
               <a:rPr lang="en-US" smtClean="0"/>
-              <a:t>7/15/2024</a:t>
+              <a:t>7/16/2024</a:t>
             </a:fld>
             <a:endParaRPr lang="en-US"/>
           </a:p>
@@ -792,7 +800,7 @@
           <a:p>
             <a:fld id="{CA5B5D55-48F2-4437-8BA1-DE24B21E324B}" type="datetimeFigureOut">
               <a:rPr lang="en-US" smtClean="0"/>
-              <a:t>7/15/2024</a:t>
+              <a:t>7/16/2024</a:t>
             </a:fld>
             <a:endParaRPr lang="en-US"/>
           </a:p>
@@ -1053,7 +1061,7 @@
           <a:p>
             <a:fld id="{CA5B5D55-48F2-4437-8BA1-DE24B21E324B}" type="datetimeFigureOut">
               <a:rPr lang="en-US" smtClean="0"/>
-              <a:t>7/15/2024</a:t>
+              <a:t>7/16/2024</a:t>
             </a:fld>
             <a:endParaRPr lang="en-US"/>
           </a:p>
@@ -1477,7 +1485,7 @@
           <a:p>
             <a:fld id="{CA5B5D55-48F2-4437-8BA1-DE24B21E324B}" type="datetimeFigureOut">
               <a:rPr lang="en-US" smtClean="0"/>
-              <a:t>7/15/2024</a:t>
+              <a:t>7/16/2024</a:t>
             </a:fld>
             <a:endParaRPr lang="en-US"/>
           </a:p>
@@ -2014,7 +2022,7 @@
           <a:p>
             <a:fld id="{CA5B5D55-48F2-4437-8BA1-DE24B21E324B}" type="datetimeFigureOut">
               <a:rPr lang="en-US" smtClean="0"/>
-              <a:t>7/15/2024</a:t>
+              <a:t>7/16/2024</a:t>
             </a:fld>
             <a:endParaRPr lang="en-US"/>
           </a:p>
@@ -2878,7 +2886,7 @@
           <a:p>
             <a:fld id="{CA5B5D55-48F2-4437-8BA1-DE24B21E324B}" type="datetimeFigureOut">
               <a:rPr lang="en-US" smtClean="0"/>
-              <a:t>7/15/2024</a:t>
+              <a:t>7/16/2024</a:t>
             </a:fld>
             <a:endParaRPr lang="en-US"/>
           </a:p>
@@ -3048,7 +3056,7 @@
           <a:p>
             <a:fld id="{CA5B5D55-48F2-4437-8BA1-DE24B21E324B}" type="datetimeFigureOut">
               <a:rPr lang="en-US" smtClean="0"/>
-              <a:t>7/15/2024</a:t>
+              <a:t>7/16/2024</a:t>
             </a:fld>
             <a:endParaRPr lang="en-US"/>
           </a:p>
@@ -3232,7 +3240,7 @@
           <a:p>
             <a:fld id="{CA5B5D55-48F2-4437-8BA1-DE24B21E324B}" type="datetimeFigureOut">
               <a:rPr lang="en-US" smtClean="0"/>
-              <a:t>7/15/2024</a:t>
+              <a:t>7/16/2024</a:t>
             </a:fld>
             <a:endParaRPr lang="en-US"/>
           </a:p>
@@ -3402,7 +3410,7 @@
           <a:p>
             <a:fld id="{CA5B5D55-48F2-4437-8BA1-DE24B21E324B}" type="datetimeFigureOut">
               <a:rPr lang="en-US" smtClean="0"/>
-              <a:t>7/15/2024</a:t>
+              <a:t>7/16/2024</a:t>
             </a:fld>
             <a:endParaRPr lang="en-US"/>
           </a:p>
@@ -3646,7 +3654,7 @@
           <a:p>
             <a:fld id="{CA5B5D55-48F2-4437-8BA1-DE24B21E324B}" type="datetimeFigureOut">
               <a:rPr lang="en-US" smtClean="0"/>
-              <a:t>7/15/2024</a:t>
+              <a:t>7/16/2024</a:t>
             </a:fld>
             <a:endParaRPr lang="en-US"/>
           </a:p>
@@ -3882,7 +3890,7 @@
           <a:p>
             <a:fld id="{CA5B5D55-48F2-4437-8BA1-DE24B21E324B}" type="datetimeFigureOut">
               <a:rPr lang="en-US" smtClean="0"/>
-              <a:t>7/15/2024</a:t>
+              <a:t>7/16/2024</a:t>
             </a:fld>
             <a:endParaRPr lang="en-US"/>
           </a:p>
@@ -4348,7 +4356,7 @@
           <a:p>
             <a:fld id="{CA5B5D55-48F2-4437-8BA1-DE24B21E324B}" type="datetimeFigureOut">
               <a:rPr lang="en-US" smtClean="0"/>
-              <a:t>7/15/2024</a:t>
+              <a:t>7/16/2024</a:t>
             </a:fld>
             <a:endParaRPr lang="en-US"/>
           </a:p>
@@ -4466,7 +4474,7 @@
           <a:p>
             <a:fld id="{CA5B5D55-48F2-4437-8BA1-DE24B21E324B}" type="datetimeFigureOut">
               <a:rPr lang="en-US" smtClean="0"/>
-              <a:t>7/15/2024</a:t>
+              <a:t>7/16/2024</a:t>
             </a:fld>
             <a:endParaRPr lang="en-US"/>
           </a:p>
@@ -4561,7 +4569,7 @@
           <a:p>
             <a:fld id="{CA5B5D55-48F2-4437-8BA1-DE24B21E324B}" type="datetimeFigureOut">
               <a:rPr lang="en-US" smtClean="0"/>
-              <a:t>7/15/2024</a:t>
+              <a:t>7/16/2024</a:t>
             </a:fld>
             <a:endParaRPr lang="en-US"/>
           </a:p>
@@ -4816,7 +4824,7 @@
           <a:p>
             <a:fld id="{CA5B5D55-48F2-4437-8BA1-DE24B21E324B}" type="datetimeFigureOut">
               <a:rPr lang="en-US" smtClean="0"/>
-              <a:t>7/15/2024</a:t>
+              <a:t>7/16/2024</a:t>
             </a:fld>
             <a:endParaRPr lang="en-US"/>
           </a:p>
@@ -5116,7 +5124,7 @@
           <a:p>
             <a:fld id="{CA5B5D55-48F2-4437-8BA1-DE24B21E324B}" type="datetimeFigureOut">
               <a:rPr lang="en-US" smtClean="0"/>
-              <a:t>7/15/2024</a:t>
+              <a:t>7/16/2024</a:t>
             </a:fld>
             <a:endParaRPr lang="en-US"/>
           </a:p>
@@ -5350,7 +5358,7 @@
           <a:p>
             <a:fld id="{CA5B5D55-48F2-4437-8BA1-DE24B21E324B}" type="datetimeFigureOut">
               <a:rPr lang="en-US" smtClean="0"/>
-              <a:t>7/15/2024</a:t>
+              <a:t>7/16/2024</a:t>
             </a:fld>
             <a:endParaRPr lang="en-US"/>
           </a:p>
@@ -6177,7 +6185,7 @@
           <p:cNvPr id="2" name="Title 1">
             <a:extLst>
               <a:ext uri="{FF2B5EF4-FFF2-40B4-BE49-F238E27FC236}">
-                <a16:creationId xmlns:a16="http://schemas.microsoft.com/office/drawing/2014/main" id="{38534DEC-7AE8-1528-A433-5288DCEC3BD2}"/>
+                <a16:creationId xmlns:a16="http://schemas.microsoft.com/office/drawing/2014/main" id="{022886F5-3FE0-FBA1-D476-F4B14B452614}"/>
               </a:ext>
             </a:extLst>
           </p:cNvPr>
@@ -6194,196 +6202,51 @@
           <a:lstStyle/>
           <a:p>
             <a:r>
-              <a:rPr lang="en-US" b="1" dirty="0">
-                <a:solidFill>
-                  <a:schemeClr val="tx1">
-                    <a:lumMod val="95000"/>
-                    <a:lumOff val="5000"/>
-                  </a:schemeClr>
-                </a:solidFill>
-                <a:effectLst>
-                  <a:outerShdw blurRad="38100" dist="38100" dir="2700000" algn="tl">
-                    <a:srgbClr val="000000">
-                      <a:alpha val="43137"/>
-                    </a:srgbClr>
-                  </a:outerShdw>
-                </a:effectLst>
-              </a:rPr>
-              <a:t>Data Limitation</a:t>
-            </a:r>
-          </a:p>
-        </p:txBody>
-      </p:sp>
-      <p:sp>
-        <p:nvSpPr>
-          <p:cNvPr id="3" name="Content Placeholder 2">
+              <a:rPr lang="en-US" dirty="0"/>
+              <a:t>Min-Max Prices Per State</a:t>
+            </a:r>
+          </a:p>
+        </p:txBody>
+      </p:sp>
+      <p:pic>
+        <p:nvPicPr>
+          <p:cNvPr id="5" name="Content Placeholder 4">
             <a:extLst>
               <a:ext uri="{FF2B5EF4-FFF2-40B4-BE49-F238E27FC236}">
-                <a16:creationId xmlns:a16="http://schemas.microsoft.com/office/drawing/2014/main" id="{39587807-D63F-C6A4-BAA0-8AB2A52EBE1C}"/>
+                <a16:creationId xmlns:a16="http://schemas.microsoft.com/office/drawing/2014/main" id="{D08D6D33-4B0C-78E2-0CEE-CC5BAA877AB7}"/>
               </a:ext>
             </a:extLst>
           </p:cNvPr>
-          <p:cNvSpPr>
-            <a:spLocks noGrp="1"/>
-          </p:cNvSpPr>
+          <p:cNvPicPr>
+            <a:picLocks noGrp="1" noChangeAspect="1"/>
+          </p:cNvPicPr>
           <p:nvPr>
             <p:ph idx="1"/>
           </p:nvPr>
-        </p:nvSpPr>
-        <p:spPr/>
-        <p:txBody>
-          <a:bodyPr/>
-          <a:lstStyle/>
-          <a:p>
-            <a:pPr marL="0" indent="0">
-              <a:buNone/>
-            </a:pPr>
-            <a:r>
-              <a:rPr lang="en-US" b="1" dirty="0">
-                <a:solidFill>
-                  <a:schemeClr val="tx1">
-                    <a:lumMod val="95000"/>
-                    <a:lumOff val="5000"/>
-                  </a:schemeClr>
-                </a:solidFill>
-                <a:effectLst>
-                  <a:outerShdw blurRad="38100" dist="38100" dir="2700000" algn="tl">
-                    <a:srgbClr val="000000">
-                      <a:alpha val="43137"/>
-                    </a:srgbClr>
-                  </a:outerShdw>
-                </a:effectLst>
-              </a:rPr>
-              <a:t>Incomplete Data</a:t>
-            </a:r>
-          </a:p>
-          <a:p>
-            <a:pPr marL="0" indent="0">
-              <a:buNone/>
-            </a:pPr>
-            <a:r>
-              <a:rPr lang="en-US" b="1" dirty="0">
-                <a:solidFill>
-                  <a:schemeClr val="tx1">
-                    <a:lumMod val="95000"/>
-                    <a:lumOff val="5000"/>
-                  </a:schemeClr>
-                </a:solidFill>
-                <a:effectLst>
-                  <a:outerShdw blurRad="38100" dist="38100" dir="2700000" algn="tl">
-                    <a:srgbClr val="000000">
-                      <a:alpha val="43137"/>
-                    </a:srgbClr>
-                  </a:outerShdw>
-                </a:effectLst>
-              </a:rPr>
-              <a:t>-Data set included numerical data for 2018 but was missing key figures 2023</a:t>
-            </a:r>
-          </a:p>
-          <a:p>
-            <a:pPr marL="0" indent="0">
-              <a:buNone/>
-            </a:pPr>
-            <a:r>
-              <a:rPr lang="en-US" b="1" dirty="0">
-                <a:solidFill>
-                  <a:schemeClr val="tx1">
-                    <a:lumMod val="95000"/>
-                    <a:lumOff val="5000"/>
-                  </a:schemeClr>
-                </a:solidFill>
-                <a:effectLst>
-                  <a:outerShdw blurRad="38100" dist="38100" dir="2700000" algn="tl">
-                    <a:srgbClr val="000000">
-                      <a:alpha val="43137"/>
-                    </a:srgbClr>
-                  </a:outerShdw>
-                </a:effectLst>
-              </a:rPr>
-              <a:t>Multiple data sets used</a:t>
-            </a:r>
-          </a:p>
-          <a:p>
-            <a:pPr marL="0" indent="0">
-              <a:buNone/>
-            </a:pPr>
-            <a:r>
-              <a:rPr lang="en-US" b="1" dirty="0">
-                <a:solidFill>
-                  <a:schemeClr val="tx1">
-                    <a:lumMod val="95000"/>
-                    <a:lumOff val="5000"/>
-                  </a:schemeClr>
-                </a:solidFill>
-                <a:effectLst>
-                  <a:outerShdw blurRad="38100" dist="38100" dir="2700000" algn="tl">
-                    <a:srgbClr val="000000">
-                      <a:alpha val="43137"/>
-                    </a:srgbClr>
-                  </a:outerShdw>
-                </a:effectLst>
-              </a:rPr>
-              <a:t>- Cross-referencing sources lead to data-reliability concerns</a:t>
-            </a:r>
-          </a:p>
-          <a:p>
-            <a:pPr marL="0" indent="0">
-              <a:buNone/>
-            </a:pPr>
-            <a:r>
-              <a:rPr lang="en-US" b="1" dirty="0">
-                <a:solidFill>
-                  <a:schemeClr val="tx1">
-                    <a:lumMod val="95000"/>
-                    <a:lumOff val="5000"/>
-                  </a:schemeClr>
-                </a:solidFill>
-                <a:effectLst>
-                  <a:outerShdw blurRad="38100" dist="38100" dir="2700000" algn="tl">
-                    <a:srgbClr val="000000">
-                      <a:alpha val="43137"/>
-                    </a:srgbClr>
-                  </a:outerShdw>
-                </a:effectLst>
-              </a:rPr>
-              <a:t>Accuracy</a:t>
-            </a:r>
-          </a:p>
-          <a:p>
-            <a:pPr marL="0" indent="0">
-              <a:buNone/>
-            </a:pPr>
-            <a:r>
-              <a:rPr lang="en-US" b="1" dirty="0">
-                <a:solidFill>
-                  <a:schemeClr val="tx1">
-                    <a:lumMod val="95000"/>
-                    <a:lumOff val="5000"/>
-                  </a:schemeClr>
-                </a:solidFill>
-                <a:effectLst>
-                  <a:outerShdw blurRad="38100" dist="38100" dir="2700000" algn="tl">
-                    <a:srgbClr val="000000">
-                      <a:alpha val="43137"/>
-                    </a:srgbClr>
-                  </a:outerShdw>
-                </a:effectLst>
-              </a:rPr>
-              <a:t>-Incomplete data resulted in our group making projections to compare time periods</a:t>
-            </a:r>
-          </a:p>
-          <a:p>
-            <a:pPr marL="0" indent="0">
-              <a:buNone/>
-            </a:pPr>
-            <a:endParaRPr lang="en-US" dirty="0"/>
-          </a:p>
-        </p:txBody>
-      </p:sp>
+        </p:nvPicPr>
+        <p:blipFill>
+          <a:blip r:embed="rId2">
+            <a:extLst>
+              <a:ext uri="{28A0092B-C50C-407E-A947-70E740481C1C}">
+                <a14:useLocalDpi xmlns:a14="http://schemas.microsoft.com/office/drawing/2010/main" val="0"/>
+              </a:ext>
+            </a:extLst>
+          </a:blip>
+          <a:stretch>
+            <a:fillRect/>
+          </a:stretch>
+        </p:blipFill>
+        <p:spPr>
+          <a:xfrm>
+            <a:off x="1226383" y="1580050"/>
+            <a:ext cx="9728585" cy="4864293"/>
+          </a:xfrm>
+        </p:spPr>
+      </p:pic>
     </p:spTree>
     <p:extLst>
       <p:ext uri="{BB962C8B-B14F-4D97-AF65-F5344CB8AC3E}">
-        <p14:creationId xmlns:p14="http://schemas.microsoft.com/office/powerpoint/2010/main" val="416449881"/>
+        <p14:creationId xmlns:p14="http://schemas.microsoft.com/office/powerpoint/2010/main" val="1716703975"/>
       </p:ext>
     </p:extLst>
   </p:cSld>
@@ -6394,6 +6257,502 @@
 </file>
 
 <file path=ppt/slides/slide11.xml><?xml version="1.0" encoding="utf-8"?>
+<p:sld xmlns:a="http://schemas.openxmlformats.org/drawingml/2006/main" xmlns:r="http://schemas.openxmlformats.org/officeDocument/2006/relationships" xmlns:p="http://schemas.openxmlformats.org/presentationml/2006/main">
+  <p:cSld>
+    <p:spTree>
+      <p:nvGrpSpPr>
+        <p:cNvPr id="1" name=""/>
+        <p:cNvGrpSpPr/>
+        <p:nvPr/>
+      </p:nvGrpSpPr>
+      <p:grpSpPr>
+        <a:xfrm>
+          <a:off x="0" y="0"/>
+          <a:ext cx="0" cy="0"/>
+          <a:chOff x="0" y="0"/>
+          <a:chExt cx="0" cy="0"/>
+        </a:xfrm>
+      </p:grpSpPr>
+      <p:sp>
+        <p:nvSpPr>
+          <p:cNvPr id="2" name="Title 1">
+            <a:extLst>
+              <a:ext uri="{FF2B5EF4-FFF2-40B4-BE49-F238E27FC236}">
+                <a16:creationId xmlns:a16="http://schemas.microsoft.com/office/drawing/2014/main" id="{2F119291-A98C-7218-C38F-43824CF64DD2}"/>
+              </a:ext>
+            </a:extLst>
+          </p:cNvPr>
+          <p:cNvSpPr>
+            <a:spLocks noGrp="1"/>
+          </p:cNvSpPr>
+          <p:nvPr>
+            <p:ph type="title"/>
+          </p:nvPr>
+        </p:nvSpPr>
+        <p:spPr/>
+        <p:txBody>
+          <a:bodyPr/>
+          <a:lstStyle/>
+          <a:p>
+            <a:r>
+              <a:rPr lang="en-US" dirty="0"/>
+              <a:t>Household Income Distribution</a:t>
+            </a:r>
+          </a:p>
+        </p:txBody>
+      </p:sp>
+      <p:pic>
+        <p:nvPicPr>
+          <p:cNvPr id="7" name="Content Placeholder 6">
+            <a:extLst>
+              <a:ext uri="{FF2B5EF4-FFF2-40B4-BE49-F238E27FC236}">
+                <a16:creationId xmlns:a16="http://schemas.microsoft.com/office/drawing/2014/main" id="{A2D22D3A-797B-F2A7-6836-55D718A0FC1D}"/>
+              </a:ext>
+            </a:extLst>
+          </p:cNvPr>
+          <p:cNvPicPr>
+            <a:picLocks noGrp="1" noChangeAspect="1"/>
+          </p:cNvPicPr>
+          <p:nvPr>
+            <p:ph idx="1"/>
+          </p:nvPr>
+        </p:nvPicPr>
+        <p:blipFill>
+          <a:blip r:embed="rId2">
+            <a:extLst>
+              <a:ext uri="{28A0092B-C50C-407E-A947-70E740481C1C}">
+                <a14:useLocalDpi xmlns:a14="http://schemas.microsoft.com/office/drawing/2010/main" val="0"/>
+              </a:ext>
+            </a:extLst>
+          </a:blip>
+          <a:stretch>
+            <a:fillRect/>
+          </a:stretch>
+        </p:blipFill>
+        <p:spPr>
+          <a:xfrm>
+            <a:off x="2596697" y="1580050"/>
+            <a:ext cx="7273017" cy="5091113"/>
+          </a:xfrm>
+          <a:prstGeom prst="rect">
+            <a:avLst/>
+          </a:prstGeom>
+        </p:spPr>
+      </p:pic>
+    </p:spTree>
+    <p:extLst>
+      <p:ext uri="{BB962C8B-B14F-4D97-AF65-F5344CB8AC3E}">
+        <p14:creationId xmlns:p14="http://schemas.microsoft.com/office/powerpoint/2010/main" val="595308184"/>
+      </p:ext>
+    </p:extLst>
+  </p:cSld>
+  <p:clrMapOvr>
+    <a:masterClrMapping/>
+  </p:clrMapOvr>
+</p:sld>
+</file>
+
+<file path=ppt/slides/slide12.xml><?xml version="1.0" encoding="utf-8"?>
+<p:sld xmlns:a="http://schemas.openxmlformats.org/drawingml/2006/main" xmlns:r="http://schemas.openxmlformats.org/officeDocument/2006/relationships" xmlns:p="http://schemas.openxmlformats.org/presentationml/2006/main">
+  <p:cSld>
+    <p:spTree>
+      <p:nvGrpSpPr>
+        <p:cNvPr id="1" name=""/>
+        <p:cNvGrpSpPr/>
+        <p:nvPr/>
+      </p:nvGrpSpPr>
+      <p:grpSpPr>
+        <a:xfrm>
+          <a:off x="0" y="0"/>
+          <a:ext cx="0" cy="0"/>
+          <a:chOff x="0" y="0"/>
+          <a:chExt cx="0" cy="0"/>
+        </a:xfrm>
+      </p:grpSpPr>
+      <p:pic>
+        <p:nvPicPr>
+          <p:cNvPr id="5" name="Picture 4">
+            <a:extLst>
+              <a:ext uri="{FF2B5EF4-FFF2-40B4-BE49-F238E27FC236}">
+                <a16:creationId xmlns:a16="http://schemas.microsoft.com/office/drawing/2014/main" id="{E22573A7-B9D2-8F90-0C2D-DD25EA039AF2}"/>
+              </a:ext>
+            </a:extLst>
+          </p:cNvPr>
+          <p:cNvPicPr>
+            <a:picLocks noChangeAspect="1"/>
+          </p:cNvPicPr>
+          <p:nvPr/>
+        </p:nvPicPr>
+        <p:blipFill>
+          <a:blip r:embed="rId2">
+            <a:extLst>
+              <a:ext uri="{28A0092B-C50C-407E-A947-70E740481C1C}">
+                <a14:useLocalDpi xmlns:a14="http://schemas.microsoft.com/office/drawing/2010/main" val="0"/>
+              </a:ext>
+            </a:extLst>
+          </a:blip>
+          <a:stretch>
+            <a:fillRect/>
+          </a:stretch>
+        </p:blipFill>
+        <p:spPr>
+          <a:xfrm>
+            <a:off x="0" y="0"/>
+            <a:ext cx="12192000" cy="6861224"/>
+          </a:xfrm>
+          <a:prstGeom prst="rect">
+            <a:avLst/>
+          </a:prstGeom>
+        </p:spPr>
+      </p:pic>
+      <p:sp>
+        <p:nvSpPr>
+          <p:cNvPr id="2" name="Title 1">
+            <a:extLst>
+              <a:ext uri="{FF2B5EF4-FFF2-40B4-BE49-F238E27FC236}">
+                <a16:creationId xmlns:a16="http://schemas.microsoft.com/office/drawing/2014/main" id="{E2C2EC11-3472-2D3F-C5E4-32B7F7277C4B}"/>
+              </a:ext>
+            </a:extLst>
+          </p:cNvPr>
+          <p:cNvSpPr>
+            <a:spLocks noGrp="1"/>
+          </p:cNvSpPr>
+          <p:nvPr>
+            <p:ph type="title"/>
+          </p:nvPr>
+        </p:nvSpPr>
+        <p:spPr/>
+        <p:txBody>
+          <a:bodyPr/>
+          <a:lstStyle/>
+          <a:p>
+            <a:r>
+              <a:rPr lang="en-US" b="1" dirty="0">
+                <a:solidFill>
+                  <a:srgbClr val="FFC000"/>
+                </a:solidFill>
+                <a:effectLst>
+                  <a:outerShdw blurRad="38100" dist="38100" dir="2700000" algn="tl">
+                    <a:srgbClr val="000000">
+                      <a:alpha val="43137"/>
+                    </a:srgbClr>
+                  </a:outerShdw>
+                </a:effectLst>
+              </a:rPr>
+              <a:t>The Source</a:t>
+            </a:r>
+          </a:p>
+        </p:txBody>
+      </p:sp>
+      <p:sp>
+        <p:nvSpPr>
+          <p:cNvPr id="3" name="Content Placeholder 2">
+            <a:extLst>
+              <a:ext uri="{FF2B5EF4-FFF2-40B4-BE49-F238E27FC236}">
+                <a16:creationId xmlns:a16="http://schemas.microsoft.com/office/drawing/2014/main" id="{1203B363-330A-40F9-D143-46508CAF2BC8}"/>
+              </a:ext>
+            </a:extLst>
+          </p:cNvPr>
+          <p:cNvSpPr>
+            <a:spLocks noGrp="1"/>
+          </p:cNvSpPr>
+          <p:nvPr>
+            <p:ph idx="1"/>
+          </p:nvPr>
+        </p:nvSpPr>
+        <p:spPr/>
+        <p:txBody>
+          <a:bodyPr>
+            <a:normAutofit/>
+          </a:bodyPr>
+          <a:lstStyle/>
+          <a:p>
+            <a:r>
+              <a:rPr lang="en-US" dirty="0">
+                <a:highlight>
+                  <a:srgbClr val="F8F8F8"/>
+                </a:highlight>
+                <a:latin typeface="Slack-Lato"/>
+                <a:hlinkClick r:id="rId3"/>
+              </a:rPr>
+              <a:t>Department of Labor</a:t>
+            </a:r>
+          </a:p>
+          <a:p>
+            <a:r>
+              <a:rPr lang="en-US" dirty="0">
+                <a:highlight>
+                  <a:srgbClr val="F8F8F8"/>
+                </a:highlight>
+                <a:latin typeface="Slack-Lato"/>
+                <a:hlinkClick r:id="rId3"/>
+              </a:rPr>
+              <a:t>https://www.dol.gov/sites/dolgov/files/WB/media/NDCP-State-Level-Estimates-2018-2023.xlsx</a:t>
+            </a:r>
+          </a:p>
+          <a:p>
+            <a:r>
+              <a:rPr lang="en-US" dirty="0">
+                <a:highlight>
+                  <a:srgbClr val="F8F8F8"/>
+                </a:highlight>
+                <a:latin typeface="Slack-Lato"/>
+                <a:hlinkClick r:id="rId3"/>
+              </a:rPr>
+              <a:t>Self inc. analysis of childcare by state</a:t>
+            </a:r>
+          </a:p>
+          <a:p>
+            <a:r>
+              <a:rPr lang="en-US" dirty="0">
+                <a:highlight>
+                  <a:srgbClr val="F8F8F8"/>
+                </a:highlight>
+                <a:latin typeface="Slack-Lato"/>
+                <a:hlinkClick r:id="rId3"/>
+              </a:rPr>
+              <a:t>https://www.self.inc/info/childcare-costs-by-state/#:~:text=Key%20Statistics,%2418%2C866%20per%20child%20per%20year</a:t>
+            </a:r>
+          </a:p>
+          <a:p>
+            <a:r>
+              <a:rPr lang="en-US" dirty="0">
+                <a:highlight>
+                  <a:srgbClr val="F8F8F8"/>
+                </a:highlight>
+                <a:latin typeface="Slack-Lato"/>
+                <a:hlinkClick r:id="rId3"/>
+              </a:rPr>
+              <a:t>National Center of Education Statistics</a:t>
+            </a:r>
+          </a:p>
+          <a:p>
+            <a:r>
+              <a:rPr lang="en-US" dirty="0">
+                <a:highlight>
+                  <a:srgbClr val="F8F8F8"/>
+                </a:highlight>
+                <a:latin typeface="Slack-Lato"/>
+                <a:hlinkClick r:id="rId3"/>
+              </a:rPr>
+              <a:t>https://nces.ed.gov/programs/digest/d22/tables/dt22_102.30.asp</a:t>
+            </a:r>
+          </a:p>
+          <a:p>
+            <a:r>
+              <a:rPr lang="en-US" dirty="0">
+                <a:highlight>
+                  <a:srgbClr val="F8F8F8"/>
+                </a:highlight>
+                <a:latin typeface="Slack-Lato"/>
+                <a:hlinkClick r:id="rId3"/>
+              </a:rPr>
+              <a:t>Census API</a:t>
+            </a:r>
+          </a:p>
+          <a:p>
+            <a:r>
+              <a:rPr lang="en-US" dirty="0">
+                <a:highlight>
+                  <a:srgbClr val="F8F8F8"/>
+                </a:highlight>
+                <a:latin typeface="Slack-Lato"/>
+                <a:hlinkClick r:id="rId3"/>
+              </a:rPr>
+              <a:t>https://www.census.gov/data.html</a:t>
+            </a:r>
+          </a:p>
+          <a:p>
+            <a:endParaRPr lang="en-US" sz="1600" dirty="0">
+              <a:highlight>
+                <a:srgbClr val="F8F8F8"/>
+              </a:highlight>
+              <a:latin typeface="Slack-Lato"/>
+              <a:hlinkClick r:id="rId3"/>
+            </a:endParaRPr>
+          </a:p>
+        </p:txBody>
+      </p:sp>
+    </p:spTree>
+    <p:extLst>
+      <p:ext uri="{BB962C8B-B14F-4D97-AF65-F5344CB8AC3E}">
+        <p14:creationId xmlns:p14="http://schemas.microsoft.com/office/powerpoint/2010/main" val="3126649786"/>
+      </p:ext>
+    </p:extLst>
+  </p:cSld>
+  <p:clrMapOvr>
+    <a:masterClrMapping/>
+  </p:clrMapOvr>
+</p:sld>
+</file>
+
+<file path=ppt/slides/slide13.xml><?xml version="1.0" encoding="utf-8"?>
+<p:sld xmlns:a="http://schemas.openxmlformats.org/drawingml/2006/main" xmlns:r="http://schemas.openxmlformats.org/officeDocument/2006/relationships" xmlns:p="http://schemas.openxmlformats.org/presentationml/2006/main">
+  <p:cSld>
+    <p:spTree>
+      <p:nvGrpSpPr>
+        <p:cNvPr id="1" name=""/>
+        <p:cNvGrpSpPr/>
+        <p:nvPr/>
+      </p:nvGrpSpPr>
+      <p:grpSpPr>
+        <a:xfrm>
+          <a:off x="0" y="0"/>
+          <a:ext cx="0" cy="0"/>
+          <a:chOff x="0" y="0"/>
+          <a:chExt cx="0" cy="0"/>
+        </a:xfrm>
+      </p:grpSpPr>
+      <p:sp>
+        <p:nvSpPr>
+          <p:cNvPr id="2" name="Title 1">
+            <a:extLst>
+              <a:ext uri="{FF2B5EF4-FFF2-40B4-BE49-F238E27FC236}">
+                <a16:creationId xmlns:a16="http://schemas.microsoft.com/office/drawing/2014/main" id="{3AF8A5E6-E730-EB21-178B-1E8C38AB6F1A}"/>
+              </a:ext>
+            </a:extLst>
+          </p:cNvPr>
+          <p:cNvSpPr>
+            <a:spLocks noGrp="1"/>
+          </p:cNvSpPr>
+          <p:nvPr>
+            <p:ph type="title"/>
+          </p:nvPr>
+        </p:nvSpPr>
+        <p:spPr>
+          <a:xfrm>
+            <a:off x="838200" y="336096"/>
+            <a:ext cx="10515600" cy="1325563"/>
+          </a:xfrm>
+        </p:spPr>
+        <p:txBody>
+          <a:bodyPr/>
+          <a:lstStyle/>
+          <a:p>
+            <a:r>
+              <a:rPr lang="en-US" dirty="0"/>
+              <a:t>Data Limitations </a:t>
+            </a:r>
+          </a:p>
+        </p:txBody>
+      </p:sp>
+      <p:sp>
+        <p:nvSpPr>
+          <p:cNvPr id="3" name="Content Placeholder 2">
+            <a:extLst>
+              <a:ext uri="{FF2B5EF4-FFF2-40B4-BE49-F238E27FC236}">
+                <a16:creationId xmlns:a16="http://schemas.microsoft.com/office/drawing/2014/main" id="{AF8A5B95-6DD6-1D32-5F8A-43ACE6356228}"/>
+              </a:ext>
+            </a:extLst>
+          </p:cNvPr>
+          <p:cNvSpPr>
+            <a:spLocks noGrp="1"/>
+          </p:cNvSpPr>
+          <p:nvPr>
+            <p:ph idx="1"/>
+          </p:nvPr>
+        </p:nvSpPr>
+        <p:spPr/>
+        <p:txBody>
+          <a:bodyPr/>
+          <a:lstStyle/>
+          <a:p>
+            <a:r>
+              <a:rPr lang="en-US" dirty="0"/>
+              <a:t>Incomplete Data</a:t>
+            </a:r>
+          </a:p>
+          <a:p>
+            <a:pPr lvl="1"/>
+            <a:r>
+              <a:rPr lang="en-US" sz="1800" kern="100" dirty="0">
+                <a:effectLst/>
+                <a:latin typeface="Calibri" panose="020F0502020204030204" pitchFamily="34" charset="0"/>
+                <a:ea typeface="Calibri" panose="020F0502020204030204" pitchFamily="34" charset="0"/>
+                <a:cs typeface="Times New Roman" panose="02020603050405020304" pitchFamily="18" charset="0"/>
+              </a:rPr>
+              <a:t>Data sets included numerical data for 2018 but were missing key 2023 figures</a:t>
+            </a:r>
+          </a:p>
+          <a:p>
+            <a:endParaRPr lang="en-US" dirty="0"/>
+          </a:p>
+          <a:p>
+            <a:r>
+              <a:rPr lang="en-US" dirty="0"/>
+              <a:t>Multiple Data Sets</a:t>
+            </a:r>
+          </a:p>
+          <a:p>
+            <a:pPr lvl="1"/>
+            <a:r>
+              <a:rPr lang="en-US" sz="1800" kern="100" dirty="0">
+                <a:effectLst/>
+                <a:latin typeface="Calibri" panose="020F0502020204030204" pitchFamily="34" charset="0"/>
+                <a:ea typeface="Calibri" panose="020F0502020204030204" pitchFamily="34" charset="0"/>
+                <a:cs typeface="Times New Roman" panose="02020603050405020304" pitchFamily="18" charset="0"/>
+              </a:rPr>
+              <a:t>Cross-referencing sources </a:t>
+            </a:r>
+            <a:r>
+              <a:rPr lang="en-US" sz="1800" kern="100" dirty="0">
+                <a:latin typeface="Calibri" panose="020F0502020204030204" pitchFamily="34" charset="0"/>
+                <a:ea typeface="Calibri" panose="020F0502020204030204" pitchFamily="34" charset="0"/>
+                <a:cs typeface="Times New Roman" panose="02020603050405020304" pitchFamily="18" charset="0"/>
+              </a:rPr>
+              <a:t>can induce</a:t>
+            </a:r>
+            <a:r>
+              <a:rPr lang="en-US" sz="1800" kern="100" dirty="0">
+                <a:effectLst/>
+                <a:latin typeface="Calibri" panose="020F0502020204030204" pitchFamily="34" charset="0"/>
+                <a:ea typeface="Calibri" panose="020F0502020204030204" pitchFamily="34" charset="0"/>
+                <a:cs typeface="Times New Roman" panose="02020603050405020304" pitchFamily="18" charset="0"/>
+              </a:rPr>
+              <a:t> data-reliability concerns</a:t>
+            </a:r>
+          </a:p>
+          <a:p>
+            <a:pPr marL="457200" lvl="1" indent="0">
+              <a:buNone/>
+            </a:pPr>
+            <a:endParaRPr lang="en-US" dirty="0"/>
+          </a:p>
+          <a:p>
+            <a:r>
+              <a:rPr lang="en-US" dirty="0"/>
+              <a:t>Accuracy</a:t>
+            </a:r>
+          </a:p>
+          <a:p>
+            <a:pPr lvl="1"/>
+            <a:r>
+              <a:rPr lang="en-US" sz="1800" dirty="0">
+                <a:effectLst/>
+                <a:latin typeface="Calibri" panose="020F0502020204030204" pitchFamily="34" charset="0"/>
+                <a:ea typeface="Calibri" panose="020F0502020204030204" pitchFamily="34" charset="0"/>
+                <a:cs typeface="Times New Roman" panose="02020603050405020304" pitchFamily="18" charset="0"/>
+              </a:rPr>
+              <a:t>Incomplete data resulted in our group making projections to fully compare time periods</a:t>
+            </a:r>
+            <a:endParaRPr lang="en-US" dirty="0"/>
+          </a:p>
+        </p:txBody>
+      </p:sp>
+    </p:spTree>
+    <p:extLst>
+      <p:ext uri="{BB962C8B-B14F-4D97-AF65-F5344CB8AC3E}">
+        <p14:creationId xmlns:p14="http://schemas.microsoft.com/office/powerpoint/2010/main" val="1680065461"/>
+      </p:ext>
+    </p:extLst>
+  </p:cSld>
+  <p:clrMapOvr>
+    <a:masterClrMapping/>
+  </p:clrMapOvr>
+</p:sld>
+</file>
+
+<file path=ppt/slides/slide14.xml><?xml version="1.0" encoding="utf-8"?>
 <p:sld xmlns:a="http://schemas.openxmlformats.org/drawingml/2006/main" xmlns:r="http://schemas.openxmlformats.org/officeDocument/2006/relationships" xmlns:p="http://schemas.openxmlformats.org/presentationml/2006/main">
   <p:cSld>
     <p:spTree>
@@ -6525,7 +6884,7 @@
             </a:pPr>
             <a:r>
               <a:rPr lang="en-US" dirty="0"/>
-              <a:t>Comparisons pre covid to post covid</a:t>
+              <a:t>-Comparisons pre covid to post covid</a:t>
             </a:r>
           </a:p>
           <a:p>
@@ -6534,7 +6893,7 @@
             </a:pPr>
             <a:r>
               <a:rPr lang="en-US" dirty="0"/>
-              <a:t>Percentage of income used per child</a:t>
+              <a:t>-Percentage of income used per child</a:t>
             </a:r>
           </a:p>
           <a:p>
@@ -6645,16 +7004,6 @@
           <a:lstStyle/>
           <a:p>
             <a:r>
-              <a:rPr lang="en-US" dirty="0" err="1">
-                <a:solidFill>
-                  <a:schemeClr val="tx2">
-                    <a:lumMod val="10000"/>
-                  </a:schemeClr>
-                </a:solidFill>
-              </a:rPr>
-              <a:t>Elavator</a:t>
-            </a:r>
-            <a:r>
               <a:rPr lang="en-US" dirty="0">
                 <a:solidFill>
                   <a:schemeClr val="tx2">
@@ -6662,7 +7011,7 @@
                   </a:schemeClr>
                 </a:solidFill>
               </a:rPr>
-              <a:t> Pitch</a:t>
+              <a:t>Elevator Pitch</a:t>
             </a:r>
           </a:p>
         </p:txBody>
@@ -6797,48 +7146,40 @@
           <a:chExt cx="0" cy="0"/>
         </a:xfrm>
       </p:grpSpPr>
-      <p:pic>
-        <p:nvPicPr>
-          <p:cNvPr id="5" name="Picture 4">
+      <p:sp>
+        <p:nvSpPr>
+          <p:cNvPr id="2" name="Title 1">
             <a:extLst>
               <a:ext uri="{FF2B5EF4-FFF2-40B4-BE49-F238E27FC236}">
-                <a16:creationId xmlns:a16="http://schemas.microsoft.com/office/drawing/2014/main" id="{F4BD0216-1994-35F8-7C99-6F84EA5A77FC}"/>
+                <a16:creationId xmlns:a16="http://schemas.microsoft.com/office/drawing/2014/main" id="{3F5CC745-682A-8991-30B2-679FC3FDB3AD}"/>
               </a:ext>
             </a:extLst>
           </p:cNvPr>
-          <p:cNvPicPr>
-            <a:picLocks noChangeAspect="1"/>
-          </p:cNvPicPr>
-          <p:nvPr/>
-        </p:nvPicPr>
-        <p:blipFill>
-          <a:blip r:embed="rId2">
-            <a:extLst>
-              <a:ext uri="{28A0092B-C50C-407E-A947-70E740481C1C}">
-                <a14:useLocalDpi xmlns:a14="http://schemas.microsoft.com/office/drawing/2010/main" val="0"/>
-              </a:ext>
-            </a:extLst>
-          </a:blip>
-          <a:stretch>
-            <a:fillRect/>
-          </a:stretch>
-        </p:blipFill>
-        <p:spPr>
-          <a:xfrm>
-            <a:off x="0" y="0"/>
-            <a:ext cx="12192000" cy="6858000"/>
-          </a:xfrm>
-          <a:prstGeom prst="rect">
-            <a:avLst/>
-          </a:prstGeom>
-        </p:spPr>
-      </p:pic>
-      <p:sp>
-        <p:nvSpPr>
-          <p:cNvPr id="2" name="Title 1">
+          <p:cNvSpPr>
+            <a:spLocks noGrp="1"/>
+          </p:cNvSpPr>
+          <p:nvPr>
+            <p:ph type="title"/>
+          </p:nvPr>
+        </p:nvSpPr>
+        <p:spPr/>
+        <p:txBody>
+          <a:bodyPr/>
+          <a:lstStyle/>
+          <a:p>
+            <a:r>
+              <a:rPr lang="en-US" dirty="0"/>
+              <a:t>Median Household Comparisons</a:t>
+            </a:r>
+          </a:p>
+        </p:txBody>
+      </p:sp>
+      <p:sp>
+        <p:nvSpPr>
+          <p:cNvPr id="3" name="Text Placeholder 2">
             <a:extLst>
               <a:ext uri="{FF2B5EF4-FFF2-40B4-BE49-F238E27FC236}">
-                <a16:creationId xmlns:a16="http://schemas.microsoft.com/office/drawing/2014/main" id="{3F9D1BCE-38F2-25FD-EB3B-08CC30638469}"/>
+                <a16:creationId xmlns:a16="http://schemas.microsoft.com/office/drawing/2014/main" id="{A7B3E60D-A0F0-1F83-AAB4-535A62E30FDF}"/>
               </a:ext>
             </a:extLst>
           </p:cNvPr>
@@ -6846,7 +7187,7 @@
             <a:spLocks noGrp="1"/>
           </p:cNvSpPr>
           <p:nvPr>
-            <p:ph type="title"/>
+            <p:ph type="body" idx="1"/>
           </p:nvPr>
         </p:nvSpPr>
         <p:spPr/>
@@ -6855,29 +7196,18 @@
           <a:lstStyle/>
           <a:p>
             <a:r>
-              <a:rPr lang="en-US" dirty="0">
-                <a:solidFill>
-                  <a:schemeClr val="accent2"/>
-                </a:solidFill>
-                <a:effectLst>
-                  <a:outerShdw blurRad="38100" dist="38100" dir="2700000" algn="tl">
-                    <a:srgbClr val="000000">
-                      <a:alpha val="43137"/>
-                    </a:srgbClr>
-                  </a:outerShdw>
-                </a:effectLst>
-              </a:rPr>
-              <a:t>Median Household Income </a:t>
-            </a:r>
-          </a:p>
-        </p:txBody>
-      </p:sp>
-      <p:sp>
-        <p:nvSpPr>
-          <p:cNvPr id="3" name="Content Placeholder 2">
+              <a:rPr lang="en-US" dirty="0"/>
+              <a:t>2018</a:t>
+            </a:r>
+          </a:p>
+        </p:txBody>
+      </p:sp>
+      <p:sp>
+        <p:nvSpPr>
+          <p:cNvPr id="4" name="Content Placeholder 3">
             <a:extLst>
               <a:ext uri="{FF2B5EF4-FFF2-40B4-BE49-F238E27FC236}">
-                <a16:creationId xmlns:a16="http://schemas.microsoft.com/office/drawing/2014/main" id="{D66AD4FE-C5A4-0684-1817-2F73F23526BE}"/>
+                <a16:creationId xmlns:a16="http://schemas.microsoft.com/office/drawing/2014/main" id="{71E92E76-8CE4-CBBA-9762-86AD4A126036}"/>
               </a:ext>
             </a:extLst>
           </p:cNvPr>
@@ -6885,122 +7215,200 @@
             <a:spLocks noGrp="1"/>
           </p:cNvSpPr>
           <p:nvPr>
-            <p:ph idx="1"/>
+            <p:ph sz="half" idx="2"/>
           </p:nvPr>
         </p:nvSpPr>
         <p:spPr/>
         <p:txBody>
+          <a:bodyPr>
+            <a:normAutofit fontScale="92500" lnSpcReduction="10000"/>
+          </a:bodyPr>
+          <a:lstStyle/>
+          <a:p>
+            <a:r>
+              <a:rPr lang="en-US" dirty="0"/>
+              <a:t>US Median - $59,800</a:t>
+            </a:r>
+          </a:p>
+          <a:p>
+            <a:endParaRPr lang="en-US" dirty="0"/>
+          </a:p>
+          <a:p>
+            <a:r>
+              <a:rPr lang="en-US" dirty="0"/>
+              <a:t>Greatest - $83,200 </a:t>
+            </a:r>
+            <a:r>
+              <a:rPr lang="en-US" sz="1800" dirty="0"/>
+              <a:t>(Maryland)</a:t>
+            </a:r>
+          </a:p>
+          <a:p>
+            <a:pPr marL="0" indent="0">
+              <a:buNone/>
+            </a:pPr>
+            <a:endParaRPr lang="en-US" dirty="0"/>
+          </a:p>
+          <a:p>
+            <a:r>
+              <a:rPr lang="en-US" dirty="0"/>
+              <a:t>Least - $44,100  </a:t>
+            </a:r>
+            <a:r>
+              <a:rPr lang="en-US" sz="1800" dirty="0"/>
+              <a:t>(West Virginia)</a:t>
+            </a:r>
+          </a:p>
+          <a:p>
+            <a:endParaRPr lang="en-US" dirty="0"/>
+          </a:p>
+          <a:p>
+            <a:r>
+              <a:rPr lang="en-US" dirty="0"/>
+              <a:t>State of Tennessee - $52,400</a:t>
+            </a:r>
+          </a:p>
+          <a:p>
+            <a:endParaRPr lang="en-US" dirty="0"/>
+          </a:p>
+        </p:txBody>
+      </p:sp>
+      <p:sp>
+        <p:nvSpPr>
+          <p:cNvPr id="5" name="Text Placeholder 4">
+            <a:extLst>
+              <a:ext uri="{FF2B5EF4-FFF2-40B4-BE49-F238E27FC236}">
+                <a16:creationId xmlns:a16="http://schemas.microsoft.com/office/drawing/2014/main" id="{C2CB2A16-F8C5-B412-8948-4A9D98B4569D}"/>
+              </a:ext>
+            </a:extLst>
+          </p:cNvPr>
+          <p:cNvSpPr>
+            <a:spLocks noGrp="1"/>
+          </p:cNvSpPr>
+          <p:nvPr>
+            <p:ph type="body" sz="quarter" idx="3"/>
+          </p:nvPr>
+        </p:nvSpPr>
+        <p:spPr/>
+        <p:txBody>
           <a:bodyPr/>
           <a:lstStyle/>
           <a:p>
             <a:r>
-              <a:rPr lang="en-US" dirty="0">
-                <a:solidFill>
-                  <a:schemeClr val="accent2"/>
-                </a:solidFill>
-                <a:effectLst>
-                  <a:outerShdw blurRad="38100" dist="38100" dir="2700000" algn="tl">
-                    <a:srgbClr val="000000">
-                      <a:alpha val="43137"/>
-                    </a:srgbClr>
-                  </a:outerShdw>
-                </a:effectLst>
-              </a:rPr>
-              <a:t>2018 in TN</a:t>
-            </a:r>
-          </a:p>
-          <a:p>
-            <a:r>
-              <a:rPr lang="en-US" dirty="0">
-                <a:solidFill>
-                  <a:schemeClr val="accent2"/>
-                </a:solidFill>
-                <a:effectLst>
-                  <a:outerShdw blurRad="38100" dist="38100" dir="2700000" algn="tl">
-                    <a:srgbClr val="000000">
-                      <a:alpha val="43137"/>
-                    </a:srgbClr>
-                  </a:outerShdw>
-                </a:effectLst>
-              </a:rPr>
-              <a:t>2023 in TN</a:t>
-            </a:r>
-          </a:p>
-          <a:p>
-            <a:r>
-              <a:rPr lang="en-US" dirty="0">
-                <a:solidFill>
-                  <a:schemeClr val="accent2"/>
-                </a:solidFill>
-                <a:effectLst>
-                  <a:outerShdw blurRad="38100" dist="38100" dir="2700000" algn="tl">
-                    <a:srgbClr val="000000">
-                      <a:alpha val="43137"/>
-                    </a:srgbClr>
-                  </a:outerShdw>
-                </a:effectLst>
-              </a:rPr>
-              <a:t>Highest by State 2018</a:t>
-            </a:r>
-          </a:p>
-          <a:p>
-            <a:r>
-              <a:rPr lang="en-US" dirty="0">
-                <a:solidFill>
-                  <a:schemeClr val="accent2"/>
-                </a:solidFill>
-                <a:effectLst>
-                  <a:outerShdw blurRad="38100" dist="38100" dir="2700000" algn="tl">
-                    <a:srgbClr val="000000">
-                      <a:alpha val="43137"/>
-                    </a:srgbClr>
-                  </a:outerShdw>
-                </a:effectLst>
-              </a:rPr>
-              <a:t>Lowest by State 2023</a:t>
-            </a:r>
-          </a:p>
-          <a:p>
-            <a:r>
-              <a:rPr lang="en-US" dirty="0">
-                <a:solidFill>
-                  <a:schemeClr val="accent2"/>
-                </a:solidFill>
-                <a:effectLst>
-                  <a:outerShdw blurRad="38100" dist="38100" dir="2700000" algn="tl">
-                    <a:srgbClr val="000000">
-                      <a:alpha val="43137"/>
-                    </a:srgbClr>
-                  </a:outerShdw>
-                </a:effectLst>
-              </a:rPr>
-              <a:t>US Median 2018</a:t>
-            </a:r>
-          </a:p>
-          <a:p>
-            <a:r>
-              <a:rPr lang="en-US" dirty="0">
-                <a:solidFill>
-                  <a:schemeClr val="accent2"/>
-                </a:solidFill>
-                <a:effectLst>
-                  <a:outerShdw blurRad="38100" dist="38100" dir="2700000" algn="tl">
-                    <a:srgbClr val="000000">
-                      <a:alpha val="43137"/>
-                    </a:srgbClr>
-                  </a:outerShdw>
-                </a:effectLst>
-              </a:rPr>
-              <a:t>US Median 2023</a:t>
-            </a:r>
-          </a:p>
-          <a:p>
+              <a:rPr lang="en-US" dirty="0"/>
+              <a:t>2023</a:t>
+            </a:r>
+          </a:p>
+        </p:txBody>
+      </p:sp>
+      <p:sp>
+        <p:nvSpPr>
+          <p:cNvPr id="6" name="Content Placeholder 5">
+            <a:extLst>
+              <a:ext uri="{FF2B5EF4-FFF2-40B4-BE49-F238E27FC236}">
+                <a16:creationId xmlns:a16="http://schemas.microsoft.com/office/drawing/2014/main" id="{CDCE2C3C-A5E4-FD59-5CA7-6A117E78F8CF}"/>
+              </a:ext>
+            </a:extLst>
+          </p:cNvPr>
+          <p:cNvSpPr>
+            <a:spLocks noGrp="1"/>
+          </p:cNvSpPr>
+          <p:nvPr>
+            <p:ph sz="quarter" idx="4"/>
+          </p:nvPr>
+        </p:nvSpPr>
+        <p:spPr/>
+        <p:txBody>
+          <a:bodyPr>
+            <a:normAutofit fontScale="92500" lnSpcReduction="10000"/>
+          </a:bodyPr>
+          <a:lstStyle/>
+          <a:p>
+            <a:r>
+              <a:rPr lang="en-US" dirty="0"/>
+              <a:t>US Median - $70,470</a:t>
+            </a:r>
+          </a:p>
+          <a:p>
+            <a:pPr lvl="1"/>
+            <a:r>
+              <a:rPr lang="en-US" sz="1700" dirty="0"/>
+              <a:t>17.84% increase</a:t>
+            </a:r>
+          </a:p>
+          <a:p>
+            <a:pPr marL="0" indent="0">
+              <a:buNone/>
+            </a:pPr>
             <a:endParaRPr lang="en-US" dirty="0"/>
           </a:p>
           <a:p>
+            <a:r>
+              <a:rPr lang="en-US" dirty="0"/>
+              <a:t>Greatest - $ 91,035 </a:t>
+            </a:r>
+            <a:r>
+              <a:rPr lang="en-US" sz="1800" dirty="0"/>
+              <a:t>(Massachusetts)</a:t>
+            </a:r>
+          </a:p>
+          <a:p>
             <a:pPr marL="0" indent="0">
               <a:buNone/>
             </a:pPr>
+            <a:endParaRPr lang="en-US" dirty="0"/>
+          </a:p>
+          <a:p>
+            <a:r>
+              <a:rPr lang="en-US" dirty="0"/>
+              <a:t>Least – $56,250 </a:t>
+            </a:r>
+            <a:r>
+              <a:rPr lang="en-US" sz="1800" dirty="0"/>
+              <a:t>(Mississippi)</a:t>
+            </a:r>
+          </a:p>
+          <a:p>
+            <a:endParaRPr lang="en-US" dirty="0"/>
+          </a:p>
+          <a:p>
+            <a:r>
+              <a:rPr lang="en-US" dirty="0"/>
+              <a:t>State of Tennessee - $65,730</a:t>
+            </a:r>
+          </a:p>
+          <a:p>
+            <a:pPr lvl="1"/>
+            <a:r>
+              <a:rPr lang="en-US" sz="1700" dirty="0"/>
+              <a:t>25.44% increase</a:t>
+            </a:r>
+          </a:p>
+          <a:p>
+            <a:pPr marL="0" indent="0">
+              <a:buNone/>
+            </a:pPr>
+            <a:endParaRPr lang="en-US" dirty="0"/>
+          </a:p>
+          <a:p>
+            <a:pPr marL="0" indent="0">
+              <a:buNone/>
+            </a:pPr>
+            <a:endParaRPr lang="en-US" sz="1800" dirty="0"/>
+          </a:p>
+          <a:p>
+            <a:endParaRPr lang="en-US" sz="1800" dirty="0"/>
+          </a:p>
+          <a:p>
+            <a:endParaRPr lang="en-US" sz="1800" dirty="0"/>
+          </a:p>
+          <a:p>
+            <a:pPr marL="0" indent="0">
+              <a:buNone/>
+            </a:pPr>
+            <a:endParaRPr lang="en-US" sz="1800" dirty="0"/>
+          </a:p>
+          <a:p>
             <a:endParaRPr lang="en-US" dirty="0"/>
           </a:p>
         </p:txBody>
@@ -7008,7 +7416,7 @@
     </p:spTree>
     <p:extLst>
       <p:ext uri="{BB962C8B-B14F-4D97-AF65-F5344CB8AC3E}">
-        <p14:creationId xmlns:p14="http://schemas.microsoft.com/office/powerpoint/2010/main" val="3793594891"/>
+        <p14:creationId xmlns:p14="http://schemas.microsoft.com/office/powerpoint/2010/main" val="2477413338"/>
       </p:ext>
     </p:extLst>
   </p:cSld>
@@ -7040,6 +7448,99 @@
           <p:cNvPr id="2" name="Title 1">
             <a:extLst>
               <a:ext uri="{FF2B5EF4-FFF2-40B4-BE49-F238E27FC236}">
+                <a16:creationId xmlns:a16="http://schemas.microsoft.com/office/drawing/2014/main" id="{C279D73F-AA67-5CEA-E092-D5016B01585E}"/>
+              </a:ext>
+            </a:extLst>
+          </p:cNvPr>
+          <p:cNvSpPr>
+            <a:spLocks noGrp="1"/>
+          </p:cNvSpPr>
+          <p:nvPr>
+            <p:ph type="title"/>
+          </p:nvPr>
+        </p:nvSpPr>
+        <p:spPr/>
+        <p:txBody>
+          <a:bodyPr/>
+          <a:lstStyle/>
+          <a:p>
+            <a:r>
+              <a:rPr lang="en-US" dirty="0"/>
+              <a:t>Income Comparison</a:t>
+            </a:r>
+          </a:p>
+        </p:txBody>
+      </p:sp>
+      <p:pic>
+        <p:nvPicPr>
+          <p:cNvPr id="5" name="Content Placeholder 4">
+            <a:extLst>
+              <a:ext uri="{FF2B5EF4-FFF2-40B4-BE49-F238E27FC236}">
+                <a16:creationId xmlns:a16="http://schemas.microsoft.com/office/drawing/2014/main" id="{C130A831-AF47-E64C-003F-AD3968316B72}"/>
+              </a:ext>
+            </a:extLst>
+          </p:cNvPr>
+          <p:cNvPicPr>
+            <a:picLocks noGrp="1" noChangeAspect="1"/>
+          </p:cNvPicPr>
+          <p:nvPr>
+            <p:ph idx="1"/>
+          </p:nvPr>
+        </p:nvPicPr>
+        <p:blipFill>
+          <a:blip r:embed="rId2">
+            <a:extLst>
+              <a:ext uri="{28A0092B-C50C-407E-A947-70E740481C1C}">
+                <a14:useLocalDpi xmlns:a14="http://schemas.microsoft.com/office/drawing/2010/main" val="0"/>
+              </a:ext>
+            </a:extLst>
+          </a:blip>
+          <a:stretch>
+            <a:fillRect/>
+          </a:stretch>
+        </p:blipFill>
+        <p:spPr>
+          <a:xfrm>
+            <a:off x="2755865" y="1690953"/>
+            <a:ext cx="6680270" cy="5010203"/>
+          </a:xfrm>
+        </p:spPr>
+      </p:pic>
+    </p:spTree>
+    <p:extLst>
+      <p:ext uri="{BB962C8B-B14F-4D97-AF65-F5344CB8AC3E}">
+        <p14:creationId xmlns:p14="http://schemas.microsoft.com/office/powerpoint/2010/main" val="3784116314"/>
+      </p:ext>
+    </p:extLst>
+  </p:cSld>
+  <p:clrMapOvr>
+    <a:masterClrMapping/>
+  </p:clrMapOvr>
+</p:sld>
+</file>
+
+<file path=ppt/slides/slide5.xml><?xml version="1.0" encoding="utf-8"?>
+<p:sld xmlns:a="http://schemas.openxmlformats.org/drawingml/2006/main" xmlns:r="http://schemas.openxmlformats.org/officeDocument/2006/relationships" xmlns:p="http://schemas.openxmlformats.org/presentationml/2006/main">
+  <p:cSld>
+    <p:spTree>
+      <p:nvGrpSpPr>
+        <p:cNvPr id="1" name=""/>
+        <p:cNvGrpSpPr/>
+        <p:nvPr/>
+      </p:nvGrpSpPr>
+      <p:grpSpPr>
+        <a:xfrm>
+          <a:off x="0" y="0"/>
+          <a:ext cx="0" cy="0"/>
+          <a:chOff x="0" y="0"/>
+          <a:chExt cx="0" cy="0"/>
+        </a:xfrm>
+      </p:grpSpPr>
+      <p:sp>
+        <p:nvSpPr>
+          <p:cNvPr id="2" name="Title 1">
+            <a:extLst>
+              <a:ext uri="{FF2B5EF4-FFF2-40B4-BE49-F238E27FC236}">
                 <a16:creationId xmlns:a16="http://schemas.microsoft.com/office/drawing/2014/main" id="{022886F5-3FE0-FBA1-D476-F4B14B452614}"/>
               </a:ext>
             </a:extLst>
@@ -7053,42 +7554,53 @@
         </p:nvSpPr>
         <p:spPr/>
         <p:txBody>
-          <a:bodyPr/>
-          <a:lstStyle/>
-          <a:p>
-            <a:r>
-              <a:rPr lang="en-US" dirty="0" err="1"/>
-              <a:t>Visualisation</a:t>
-            </a:r>
-            <a:endParaRPr lang="en-US" dirty="0"/>
-          </a:p>
-        </p:txBody>
-      </p:sp>
-      <p:sp>
-        <p:nvSpPr>
-          <p:cNvPr id="3" name="Content Placeholder 2">
+          <a:bodyPr>
+            <a:normAutofit/>
+          </a:bodyPr>
+          <a:lstStyle/>
+          <a:p>
+            <a:r>
+              <a:rPr lang="en-US" dirty="0"/>
+              <a:t>Median Household Income</a:t>
+            </a:r>
+          </a:p>
+        </p:txBody>
+      </p:sp>
+      <p:pic>
+        <p:nvPicPr>
+          <p:cNvPr id="5" name="Content Placeholder 4">
             <a:extLst>
               <a:ext uri="{FF2B5EF4-FFF2-40B4-BE49-F238E27FC236}">
-                <a16:creationId xmlns:a16="http://schemas.microsoft.com/office/drawing/2014/main" id="{8A439E5E-1334-8D47-A737-2B540C71C756}"/>
+                <a16:creationId xmlns:a16="http://schemas.microsoft.com/office/drawing/2014/main" id="{0969179E-1255-79B0-DD4B-F07823F93C05}"/>
               </a:ext>
             </a:extLst>
           </p:cNvPr>
-          <p:cNvSpPr>
-            <a:spLocks noGrp="1"/>
-          </p:cNvSpPr>
+          <p:cNvPicPr>
+            <a:picLocks noGrp="1" noChangeAspect="1"/>
+          </p:cNvPicPr>
           <p:nvPr>
             <p:ph idx="1"/>
           </p:nvPr>
-        </p:nvSpPr>
-        <p:spPr/>
-        <p:txBody>
-          <a:bodyPr/>
-          <a:lstStyle/>
-          <a:p>
-            <a:endParaRPr lang="en-US" dirty="0"/>
-          </a:p>
-        </p:txBody>
-      </p:sp>
+        </p:nvPicPr>
+        <p:blipFill>
+          <a:blip r:embed="rId2">
+            <a:extLst>
+              <a:ext uri="{28A0092B-C50C-407E-A947-70E740481C1C}">
+                <a14:useLocalDpi xmlns:a14="http://schemas.microsoft.com/office/drawing/2010/main" val="0"/>
+              </a:ext>
+            </a:extLst>
+          </a:blip>
+          <a:stretch>
+            <a:fillRect/>
+          </a:stretch>
+        </p:blipFill>
+        <p:spPr>
+          <a:xfrm>
+            <a:off x="1337247" y="1465884"/>
+            <a:ext cx="9506857" cy="4666401"/>
+          </a:xfrm>
+        </p:spPr>
+      </p:pic>
     </p:spTree>
     <p:extLst>
       <p:ext uri="{BB962C8B-B14F-4D97-AF65-F5344CB8AC3E}">
@@ -7102,7 +7614,7 @@
 </p:sld>
 </file>
 
-<file path=ppt/slides/slide5.xml><?xml version="1.0" encoding="utf-8"?>
+<file path=ppt/slides/slide6.xml><?xml version="1.0" encoding="utf-8"?>
 <p:sld xmlns:a="http://schemas.openxmlformats.org/drawingml/2006/main" xmlns:r="http://schemas.openxmlformats.org/officeDocument/2006/relationships" xmlns:p="http://schemas.openxmlformats.org/presentationml/2006/main">
   <p:cSld>
     <p:spTree>
@@ -7338,7 +7850,7 @@
 </p:sld>
 </file>
 
-<file path=ppt/slides/slide6.xml><?xml version="1.0" encoding="utf-8"?>
+<file path=ppt/slides/slide7.xml><?xml version="1.0" encoding="utf-8"?>
 <p:sld xmlns:a="http://schemas.openxmlformats.org/drawingml/2006/main" xmlns:r="http://schemas.openxmlformats.org/officeDocument/2006/relationships" xmlns:p="http://schemas.openxmlformats.org/presentationml/2006/main">
   <p:cSld>
     <p:spTree>
@@ -7373,42 +7885,53 @@
         </p:nvSpPr>
         <p:spPr/>
         <p:txBody>
-          <a:bodyPr/>
-          <a:lstStyle/>
-          <a:p>
-            <a:r>
-              <a:rPr lang="en-US" dirty="0" err="1"/>
-              <a:t>Visualisation</a:t>
-            </a:r>
-            <a:endParaRPr lang="en-US" dirty="0"/>
-          </a:p>
-        </p:txBody>
-      </p:sp>
-      <p:sp>
-        <p:nvSpPr>
-          <p:cNvPr id="3" name="Content Placeholder 2">
+          <a:bodyPr>
+            <a:normAutofit/>
+          </a:bodyPr>
+          <a:lstStyle/>
+          <a:p>
+            <a:r>
+              <a:rPr lang="en-US" dirty="0"/>
+              <a:t>Price Distribution</a:t>
+            </a:r>
+          </a:p>
+        </p:txBody>
+      </p:sp>
+      <p:pic>
+        <p:nvPicPr>
+          <p:cNvPr id="5" name="Content Placeholder 4">
             <a:extLst>
               <a:ext uri="{FF2B5EF4-FFF2-40B4-BE49-F238E27FC236}">
-                <a16:creationId xmlns:a16="http://schemas.microsoft.com/office/drawing/2014/main" id="{8A439E5E-1334-8D47-A737-2B540C71C756}"/>
+                <a16:creationId xmlns:a16="http://schemas.microsoft.com/office/drawing/2014/main" id="{A3CD1561-61C3-99A9-1381-8B20BE126791}"/>
               </a:ext>
             </a:extLst>
           </p:cNvPr>
-          <p:cNvSpPr>
-            <a:spLocks noGrp="1"/>
-          </p:cNvSpPr>
+          <p:cNvPicPr>
+            <a:picLocks noGrp="1" noChangeAspect="1"/>
+          </p:cNvPicPr>
           <p:nvPr>
             <p:ph idx="1"/>
           </p:nvPr>
-        </p:nvSpPr>
-        <p:spPr/>
-        <p:txBody>
-          <a:bodyPr/>
-          <a:lstStyle/>
-          <a:p>
-            <a:endParaRPr lang="en-US" dirty="0"/>
-          </a:p>
-        </p:txBody>
-      </p:sp>
+        </p:nvPicPr>
+        <p:blipFill>
+          <a:blip r:embed="rId2">
+            <a:extLst>
+              <a:ext uri="{28A0092B-C50C-407E-A947-70E740481C1C}">
+                <a14:useLocalDpi xmlns:a14="http://schemas.microsoft.com/office/drawing/2010/main" val="0"/>
+              </a:ext>
+            </a:extLst>
+          </a:blip>
+          <a:stretch>
+            <a:fillRect/>
+          </a:stretch>
+        </p:blipFill>
+        <p:spPr>
+          <a:xfrm>
+            <a:off x="2607247" y="1580050"/>
+            <a:ext cx="6966857" cy="5192865"/>
+          </a:xfrm>
+        </p:spPr>
+      </p:pic>
     </p:spTree>
     <p:extLst>
       <p:ext uri="{BB962C8B-B14F-4D97-AF65-F5344CB8AC3E}">
@@ -7422,7 +7945,107 @@
 </p:sld>
 </file>
 
-<file path=ppt/slides/slide7.xml><?xml version="1.0" encoding="utf-8"?>
+<file path=ppt/slides/slide8.xml><?xml version="1.0" encoding="utf-8"?>
+<p:sld xmlns:a="http://schemas.openxmlformats.org/drawingml/2006/main" xmlns:r="http://schemas.openxmlformats.org/officeDocument/2006/relationships" xmlns:p="http://schemas.openxmlformats.org/presentationml/2006/main">
+  <p:cSld>
+    <p:spTree>
+      <p:nvGrpSpPr>
+        <p:cNvPr id="1" name=""/>
+        <p:cNvGrpSpPr/>
+        <p:nvPr/>
+      </p:nvGrpSpPr>
+      <p:grpSpPr>
+        <a:xfrm>
+          <a:off x="0" y="0"/>
+          <a:ext cx="0" cy="0"/>
+          <a:chOff x="0" y="0"/>
+          <a:chExt cx="0" cy="0"/>
+        </a:xfrm>
+      </p:grpSpPr>
+      <p:sp>
+        <p:nvSpPr>
+          <p:cNvPr id="2" name="Title 1">
+            <a:extLst>
+              <a:ext uri="{FF2B5EF4-FFF2-40B4-BE49-F238E27FC236}">
+                <a16:creationId xmlns:a16="http://schemas.microsoft.com/office/drawing/2014/main" id="{015BEC9F-E2A8-C9EC-E4CD-0820317844A9}"/>
+              </a:ext>
+            </a:extLst>
+          </p:cNvPr>
+          <p:cNvSpPr>
+            <a:spLocks noGrp="1"/>
+          </p:cNvSpPr>
+          <p:nvPr>
+            <p:ph type="title"/>
+          </p:nvPr>
+        </p:nvSpPr>
+        <p:spPr>
+          <a:xfrm>
+            <a:off x="919119" y="466366"/>
+            <a:ext cx="10353762" cy="970450"/>
+          </a:xfrm>
+        </p:spPr>
+        <p:txBody>
+          <a:bodyPr>
+            <a:normAutofit/>
+          </a:bodyPr>
+          <a:lstStyle/>
+          <a:p>
+            <a:r>
+              <a:rPr lang="en-US" dirty="0"/>
+              <a:t>Yearly Median Prices </a:t>
+            </a:r>
+          </a:p>
+        </p:txBody>
+      </p:sp>
+      <p:pic>
+        <p:nvPicPr>
+          <p:cNvPr id="5" name="Content Placeholder 4">
+            <a:extLst>
+              <a:ext uri="{FF2B5EF4-FFF2-40B4-BE49-F238E27FC236}">
+                <a16:creationId xmlns:a16="http://schemas.microsoft.com/office/drawing/2014/main" id="{8F4DED0E-05C6-C414-F1C4-03933CCF1348}"/>
+              </a:ext>
+            </a:extLst>
+          </p:cNvPr>
+          <p:cNvPicPr>
+            <a:picLocks noGrp="1" noChangeAspect="1"/>
+          </p:cNvPicPr>
+          <p:nvPr>
+            <p:ph idx="1"/>
+          </p:nvPr>
+        </p:nvPicPr>
+        <p:blipFill>
+          <a:blip r:embed="rId2">
+            <a:extLst>
+              <a:ext uri="{28A0092B-C50C-407E-A947-70E740481C1C}">
+                <a14:useLocalDpi xmlns:a14="http://schemas.microsoft.com/office/drawing/2010/main" val="0"/>
+              </a:ext>
+            </a:extLst>
+          </a:blip>
+          <a:stretch>
+            <a:fillRect/>
+          </a:stretch>
+        </p:blipFill>
+        <p:spPr>
+          <a:xfrm>
+            <a:off x="1640114" y="1436816"/>
+            <a:ext cx="8911772" cy="5130897"/>
+          </a:xfrm>
+        </p:spPr>
+      </p:pic>
+    </p:spTree>
+    <p:extLst>
+      <p:ext uri="{BB962C8B-B14F-4D97-AF65-F5344CB8AC3E}">
+        <p14:creationId xmlns:p14="http://schemas.microsoft.com/office/powerpoint/2010/main" val="805225283"/>
+      </p:ext>
+    </p:extLst>
+  </p:cSld>
+  <p:clrMapOvr>
+    <a:masterClrMapping/>
+  </p:clrMapOvr>
+</p:sld>
+</file>
+
+<file path=ppt/slides/slide9.xml><?xml version="1.0" encoding="utf-8"?>
 <p:sld xmlns:a="http://schemas.openxmlformats.org/drawingml/2006/main" xmlns:r="http://schemas.openxmlformats.org/officeDocument/2006/relationships" xmlns:p="http://schemas.openxmlformats.org/presentationml/2006/main">
   <p:cSld>
     <p:spTree>
@@ -7704,363 +8327,6 @@
     <p:extLst>
       <p:ext uri="{BB962C8B-B14F-4D97-AF65-F5344CB8AC3E}">
         <p14:creationId xmlns:p14="http://schemas.microsoft.com/office/powerpoint/2010/main" val="2498559049"/>
-      </p:ext>
-    </p:extLst>
-  </p:cSld>
-  <p:clrMapOvr>
-    <a:masterClrMapping/>
-  </p:clrMapOvr>
-</p:sld>
-</file>
-
-<file path=ppt/slides/slide8.xml><?xml version="1.0" encoding="utf-8"?>
-<p:sld xmlns:a="http://schemas.openxmlformats.org/drawingml/2006/main" xmlns:r="http://schemas.openxmlformats.org/officeDocument/2006/relationships" xmlns:p="http://schemas.openxmlformats.org/presentationml/2006/main">
-  <p:cSld>
-    <p:spTree>
-      <p:nvGrpSpPr>
-        <p:cNvPr id="1" name=""/>
-        <p:cNvGrpSpPr/>
-        <p:nvPr/>
-      </p:nvGrpSpPr>
-      <p:grpSpPr>
-        <a:xfrm>
-          <a:off x="0" y="0"/>
-          <a:ext cx="0" cy="0"/>
-          <a:chOff x="0" y="0"/>
-          <a:chExt cx="0" cy="0"/>
-        </a:xfrm>
-      </p:grpSpPr>
-      <p:sp>
-        <p:nvSpPr>
-          <p:cNvPr id="2" name="Title 1">
-            <a:extLst>
-              <a:ext uri="{FF2B5EF4-FFF2-40B4-BE49-F238E27FC236}">
-                <a16:creationId xmlns:a16="http://schemas.microsoft.com/office/drawing/2014/main" id="{022886F5-3FE0-FBA1-D476-F4B14B452614}"/>
-              </a:ext>
-            </a:extLst>
-          </p:cNvPr>
-          <p:cNvSpPr>
-            <a:spLocks noGrp="1"/>
-          </p:cNvSpPr>
-          <p:nvPr>
-            <p:ph type="title"/>
-          </p:nvPr>
-        </p:nvSpPr>
-        <p:spPr/>
-        <p:txBody>
-          <a:bodyPr/>
-          <a:lstStyle/>
-          <a:p>
-            <a:r>
-              <a:rPr lang="en-US" dirty="0" err="1"/>
-              <a:t>Visualisation</a:t>
-            </a:r>
-            <a:endParaRPr lang="en-US" dirty="0"/>
-          </a:p>
-        </p:txBody>
-      </p:sp>
-      <p:sp>
-        <p:nvSpPr>
-          <p:cNvPr id="3" name="Content Placeholder 2">
-            <a:extLst>
-              <a:ext uri="{FF2B5EF4-FFF2-40B4-BE49-F238E27FC236}">
-                <a16:creationId xmlns:a16="http://schemas.microsoft.com/office/drawing/2014/main" id="{8A439E5E-1334-8D47-A737-2B540C71C756}"/>
-              </a:ext>
-            </a:extLst>
-          </p:cNvPr>
-          <p:cNvSpPr>
-            <a:spLocks noGrp="1"/>
-          </p:cNvSpPr>
-          <p:nvPr>
-            <p:ph idx="1"/>
-          </p:nvPr>
-        </p:nvSpPr>
-        <p:spPr/>
-        <p:txBody>
-          <a:bodyPr/>
-          <a:lstStyle/>
-          <a:p>
-            <a:endParaRPr lang="en-US" dirty="0"/>
-          </a:p>
-        </p:txBody>
-      </p:sp>
-    </p:spTree>
-    <p:extLst>
-      <p:ext uri="{BB962C8B-B14F-4D97-AF65-F5344CB8AC3E}">
-        <p14:creationId xmlns:p14="http://schemas.microsoft.com/office/powerpoint/2010/main" val="1716703975"/>
-      </p:ext>
-    </p:extLst>
-  </p:cSld>
-  <p:clrMapOvr>
-    <a:masterClrMapping/>
-  </p:clrMapOvr>
-</p:sld>
-</file>
-
-<file path=ppt/slides/slide9.xml><?xml version="1.0" encoding="utf-8"?>
-<p:sld xmlns:a="http://schemas.openxmlformats.org/drawingml/2006/main" xmlns:r="http://schemas.openxmlformats.org/officeDocument/2006/relationships" xmlns:p="http://schemas.openxmlformats.org/presentationml/2006/main">
-  <p:cSld>
-    <p:spTree>
-      <p:nvGrpSpPr>
-        <p:cNvPr id="1" name=""/>
-        <p:cNvGrpSpPr/>
-        <p:nvPr/>
-      </p:nvGrpSpPr>
-      <p:grpSpPr>
-        <a:xfrm>
-          <a:off x="0" y="0"/>
-          <a:ext cx="0" cy="0"/>
-          <a:chOff x="0" y="0"/>
-          <a:chExt cx="0" cy="0"/>
-        </a:xfrm>
-      </p:grpSpPr>
-      <p:pic>
-        <p:nvPicPr>
-          <p:cNvPr id="5" name="Picture 4">
-            <a:extLst>
-              <a:ext uri="{FF2B5EF4-FFF2-40B4-BE49-F238E27FC236}">
-                <a16:creationId xmlns:a16="http://schemas.microsoft.com/office/drawing/2014/main" id="{E22573A7-B9D2-8F90-0C2D-DD25EA039AF2}"/>
-              </a:ext>
-            </a:extLst>
-          </p:cNvPr>
-          <p:cNvPicPr>
-            <a:picLocks noChangeAspect="1"/>
-          </p:cNvPicPr>
-          <p:nvPr/>
-        </p:nvPicPr>
-        <p:blipFill>
-          <a:blip r:embed="rId2">
-            <a:extLst>
-              <a:ext uri="{28A0092B-C50C-407E-A947-70E740481C1C}">
-                <a14:useLocalDpi xmlns:a14="http://schemas.microsoft.com/office/drawing/2010/main" val="0"/>
-              </a:ext>
-            </a:extLst>
-          </a:blip>
-          <a:stretch>
-            <a:fillRect/>
-          </a:stretch>
-        </p:blipFill>
-        <p:spPr>
-          <a:xfrm>
-            <a:off x="0" y="0"/>
-            <a:ext cx="12192000" cy="6861224"/>
-          </a:xfrm>
-          <a:prstGeom prst="rect">
-            <a:avLst/>
-          </a:prstGeom>
-        </p:spPr>
-      </p:pic>
-      <p:sp>
-        <p:nvSpPr>
-          <p:cNvPr id="2" name="Title 1">
-            <a:extLst>
-              <a:ext uri="{FF2B5EF4-FFF2-40B4-BE49-F238E27FC236}">
-                <a16:creationId xmlns:a16="http://schemas.microsoft.com/office/drawing/2014/main" id="{E2C2EC11-3472-2D3F-C5E4-32B7F7277C4B}"/>
-              </a:ext>
-            </a:extLst>
-          </p:cNvPr>
-          <p:cNvSpPr>
-            <a:spLocks noGrp="1"/>
-          </p:cNvSpPr>
-          <p:nvPr>
-            <p:ph type="title"/>
-          </p:nvPr>
-        </p:nvSpPr>
-        <p:spPr/>
-        <p:txBody>
-          <a:bodyPr/>
-          <a:lstStyle/>
-          <a:p>
-            <a:r>
-              <a:rPr lang="en-US" b="1" dirty="0">
-                <a:solidFill>
-                  <a:schemeClr val="bg1"/>
-                </a:solidFill>
-                <a:effectLst>
-                  <a:outerShdw blurRad="38100" dist="38100" dir="2700000" algn="tl">
-                    <a:srgbClr val="000000">
-                      <a:alpha val="43137"/>
-                    </a:srgbClr>
-                  </a:outerShdw>
-                </a:effectLst>
-              </a:rPr>
-              <a:t>The Source</a:t>
-            </a:r>
-          </a:p>
-        </p:txBody>
-      </p:sp>
-      <p:sp>
-        <p:nvSpPr>
-          <p:cNvPr id="3" name="Content Placeholder 2">
-            <a:extLst>
-              <a:ext uri="{FF2B5EF4-FFF2-40B4-BE49-F238E27FC236}">
-                <a16:creationId xmlns:a16="http://schemas.microsoft.com/office/drawing/2014/main" id="{1203B363-330A-40F9-D143-46508CAF2BC8}"/>
-              </a:ext>
-            </a:extLst>
-          </p:cNvPr>
-          <p:cNvSpPr>
-            <a:spLocks noGrp="1"/>
-          </p:cNvSpPr>
-          <p:nvPr>
-            <p:ph idx="1"/>
-          </p:nvPr>
-        </p:nvSpPr>
-        <p:spPr/>
-        <p:txBody>
-          <a:bodyPr>
-            <a:normAutofit fontScale="92500" lnSpcReduction="20000"/>
-          </a:bodyPr>
-          <a:lstStyle/>
-          <a:p>
-            <a:pPr marL="0" indent="0">
-              <a:buNone/>
-            </a:pPr>
-            <a:r>
-              <a:rPr lang="en-US" sz="2400" dirty="0">
-                <a:highlight>
-                  <a:srgbClr val="F8F8F8"/>
-                </a:highlight>
-                <a:latin typeface="Slack-Lato"/>
-              </a:rPr>
-              <a:t>Department of Labor</a:t>
-            </a:r>
-            <a:endParaRPr lang="en-US" sz="2400" b="0" i="0" strike="noStrike" dirty="0">
-              <a:effectLst/>
-              <a:highlight>
-                <a:srgbClr val="F8F8F8"/>
-              </a:highlight>
-              <a:latin typeface="Slack-Lato"/>
-              <a:hlinkClick r:id="rId3"/>
-            </a:endParaRPr>
-          </a:p>
-          <a:p>
-            <a:r>
-              <a:rPr lang="en-US" sz="2400" b="0" i="0" u="none" strike="noStrike" dirty="0">
-                <a:effectLst/>
-                <a:highlight>
-                  <a:srgbClr val="F8F8F8"/>
-                </a:highlight>
-                <a:latin typeface="Slack-Lato"/>
-                <a:hlinkClick r:id="rId3"/>
-              </a:rPr>
-              <a:t>https://www.dol.gov/sites/dolgov/files/WB/media/NDCP-State-Level-Estimates-2018-2023.xlsx</a:t>
-            </a:r>
-          </a:p>
-          <a:p>
-            <a:pPr marL="0" indent="0">
-              <a:buNone/>
-            </a:pPr>
-            <a:r>
-              <a:rPr lang="en-US" sz="2400" dirty="0">
-                <a:highlight>
-                  <a:srgbClr val="F8F8F8"/>
-                </a:highlight>
-                <a:latin typeface="Slack-Lato"/>
-              </a:rPr>
-              <a:t>Self inc. analysis of childcare by state</a:t>
-            </a:r>
-            <a:endParaRPr lang="en-US" sz="2400" b="0" i="0" u="none" strike="noStrike" dirty="0">
-              <a:effectLst/>
-              <a:highlight>
-                <a:srgbClr val="F8F8F8"/>
-              </a:highlight>
-              <a:latin typeface="Slack-Lato"/>
-              <a:hlinkClick r:id="rId3"/>
-            </a:endParaRPr>
-          </a:p>
-          <a:p>
-            <a:r>
-              <a:rPr lang="en-US" sz="2400" dirty="0">
-                <a:highlight>
-                  <a:srgbClr val="F8F8F8"/>
-                </a:highlight>
-                <a:latin typeface="Slack-Lato"/>
-                <a:hlinkClick r:id="rId3"/>
-              </a:rPr>
-              <a:t>https://www.self.inc/info/childcare-costs-by-state/#:~:text=Key%20Statistics,%2418%2C866%20per%20child%20per%20year</a:t>
-            </a:r>
-          </a:p>
-          <a:p>
-            <a:pPr marL="0" indent="0">
-              <a:buNone/>
-            </a:pPr>
-            <a:r>
-              <a:rPr lang="en-US" sz="2400" dirty="0">
-                <a:highlight>
-                  <a:srgbClr val="F8F8F8"/>
-                </a:highlight>
-                <a:latin typeface="Slack-Lato"/>
-              </a:rPr>
-              <a:t>National Center of Education Statistics</a:t>
-            </a:r>
-            <a:endParaRPr lang="en-US" sz="2400" dirty="0">
-              <a:highlight>
-                <a:srgbClr val="F8F8F8"/>
-              </a:highlight>
-              <a:latin typeface="Slack-Lato"/>
-              <a:hlinkClick r:id="rId3"/>
-            </a:endParaRPr>
-          </a:p>
-          <a:p>
-            <a:r>
-              <a:rPr lang="en-US" sz="2400" dirty="0">
-                <a:highlight>
-                  <a:srgbClr val="F8F8F8"/>
-                </a:highlight>
-                <a:latin typeface="Slack-Lato"/>
-                <a:hlinkClick r:id="rId3"/>
-              </a:rPr>
-              <a:t>https://nces.ed.gov/programs/digest/d22/tables/dt22_102.30.asp</a:t>
-            </a:r>
-          </a:p>
-          <a:p>
-            <a:pPr marL="0" indent="0">
-              <a:buNone/>
-            </a:pPr>
-            <a:r>
-              <a:rPr lang="en-US" sz="2400" dirty="0">
-                <a:highlight>
-                  <a:srgbClr val="F8F8F8"/>
-                </a:highlight>
-                <a:latin typeface="Slack-Lato"/>
-              </a:rPr>
-              <a:t>Census API</a:t>
-            </a:r>
-            <a:endParaRPr lang="en-US" sz="2400" dirty="0">
-              <a:highlight>
-                <a:srgbClr val="F8F8F8"/>
-              </a:highlight>
-              <a:latin typeface="Slack-Lato"/>
-              <a:hlinkClick r:id="rId3"/>
-            </a:endParaRPr>
-          </a:p>
-          <a:p>
-            <a:r>
-              <a:rPr lang="en-US" sz="2400" dirty="0">
-                <a:highlight>
-                  <a:srgbClr val="F8F8F8"/>
-                </a:highlight>
-                <a:latin typeface="Slack-Lato"/>
-                <a:hlinkClick r:id="rId3"/>
-              </a:rPr>
-              <a:t>https://www.census.gov/data.html</a:t>
-            </a:r>
-          </a:p>
-          <a:p>
-            <a:endParaRPr lang="en-US" sz="2400" dirty="0">
-              <a:highlight>
-                <a:srgbClr val="F8F8F8"/>
-              </a:highlight>
-              <a:latin typeface="Slack-Lato"/>
-              <a:hlinkClick r:id="rId3"/>
-            </a:endParaRPr>
-          </a:p>
-        </p:txBody>
-      </p:sp>
-    </p:spTree>
-    <p:extLst>
-      <p:ext uri="{BB962C8B-B14F-4D97-AF65-F5344CB8AC3E}">
-        <p14:creationId xmlns:p14="http://schemas.microsoft.com/office/powerpoint/2010/main" val="3126649786"/>
       </p:ext>
     </p:extLst>
   </p:cSld>

</xml_diff>